<commit_message>
SVPWM ile çalışan MPC modeli eklendi. (çalışıyor ama fazla torque ripple'a sahip)
</commit_message>
<xml_diff>
--- a/Simulation/MPC/Sunumlar/MPC_sunum_week23.pptx
+++ b/Simulation/MPC/Sunumlar/MPC_sunum_week23.pptx
@@ -4196,7 +4196,7 @@
           <a:graphicData uri="http://schemas.openxmlformats.org/presentationml/2006/ole">
             <mc:AlternateContent xmlns:mc="http://schemas.openxmlformats.org/markup-compatibility/2006">
               <mc:Choice xmlns:v="urn:schemas-microsoft-com:vml" Requires="v">
-                <p:oleObj spid="_x0000_s1029" name="Equation" r:id="rId3" imgW="1663700" imgH="685800" progId="Equation.3">
+                <p:oleObj spid="_x0000_s1039" name="Equation" r:id="rId3" imgW="1663700" imgH="685800" progId="Equation.3">
                   <p:embed/>
                 </p:oleObj>
               </mc:Choice>
@@ -4307,7 +4307,7 @@
           <a:graphicData uri="http://schemas.openxmlformats.org/presentationml/2006/ole">
             <mc:AlternateContent xmlns:mc="http://schemas.openxmlformats.org/markup-compatibility/2006">
               <mc:Choice xmlns:v="urn:schemas-microsoft-com:vml" Requires="v">
-                <p:oleObj spid="_x0000_s1030" name="Equation" r:id="rId5" imgW="1778000" imgH="825500" progId="Equation.3">
+                <p:oleObj spid="_x0000_s1040" name="Equation" r:id="rId5" imgW="1778000" imgH="825500" progId="Equation.3">
                   <p:embed/>
                 </p:oleObj>
               </mc:Choice>
@@ -4691,9 +4691,40 @@
               <a:rPr lang="tr-TR" dirty="0"/>
               <a:t> değerler üzerinden ilerliyor.</a:t>
             </a:r>
-            <a:endParaRPr lang="en-US" dirty="0"/>
-          </a:p>
-          <a:p>
+          </a:p>
+          <a:p>
+            <a:r>
+              <a:rPr lang="tr-TR" dirty="0" err="1"/>
+              <a:t>Torque</a:t>
+            </a:r>
+            <a:r>
+              <a:rPr lang="tr-TR" dirty="0"/>
+              <a:t> </a:t>
+            </a:r>
+            <a:r>
+              <a:rPr lang="tr-TR" dirty="0" err="1"/>
+              <a:t>ripple</a:t>
+            </a:r>
+            <a:r>
+              <a:rPr lang="tr-TR" dirty="0"/>
+              <a:t> </a:t>
+            </a:r>
+            <a:r>
+              <a:rPr lang="tr-TR" dirty="0" err="1"/>
+              <a:t>estimation</a:t>
+            </a:r>
+            <a:r>
+              <a:rPr lang="tr-TR" dirty="0"/>
+              <a:t> düzgün çalışmadı (sebebi bu </a:t>
+            </a:r>
+            <a:r>
+              <a:rPr lang="tr-TR" dirty="0" err="1"/>
+              <a:t>ma</a:t>
+            </a:r>
+            <a:r>
+              <a:rPr lang="tr-TR" dirty="0"/>
+              <a:t> değerinin 0-1 olması olabilir.)</a:t>
+            </a:r>
             <a:endParaRPr lang="en-US" dirty="0"/>
           </a:p>
         </p:txBody>
@@ -5130,7 +5161,18 @@
             </a:r>
             <a:r>
               <a:rPr lang="tr-TR" dirty="0"/>
-              <a:t> uygulanabilir. Bakılacak.</a:t>
+              <a:t> uygulanabilir</a:t>
+            </a:r>
+            <a:r>
+              <a:rPr lang="tr-TR"/>
+              <a:t>. </a:t>
+            </a:r>
+            <a:endParaRPr lang="tr-TR" dirty="0"/>
+          </a:p>
+          <a:p>
+            <a:r>
+              <a:rPr lang="tr-TR" dirty="0"/>
+              <a:t>NETİCE: Literatür taraması yapılacak.</a:t>
             </a:r>
           </a:p>
         </p:txBody>

</xml_diff>